<commit_message>
Minor fixes on methods advanced slides
</commit_message>
<xml_diff>
--- a/Courses/Software-Sciences/Module-1-OOP/05.2-Methods-Advanced/05.2-Methods-Advanced.pptx
+++ b/Courses/Software-Sciences/Module-1-OOP/05.2-Methods-Advanced/05.2-Methods-Advanced.pptx
@@ -315,7 +315,7 @@
           <a:p>
             <a:fld id="{4E087215-0C8F-4762-A664-737A353EC9A4}" type="datetimeFigureOut">
               <a:rPr lang="bg-BG" smtClean="0"/>
-              <a:t>11.05.23 г.</a:t>
+              <a:t>17.05.23 г.</a:t>
             </a:fld>
             <a:endParaRPr lang="bg-BG"/>
           </a:p>
@@ -506,7 +506,7 @@
           <a:p>
             <a:fld id="{72D84649-876A-46C9-8472-14CB09C070D8}" type="datetimeFigureOut">
               <a:rPr lang="en-US" smtClean="0"/>
-              <a:t>5/11/23</a:t>
+              <a:t>5/17/23</a:t>
             </a:fld>
             <a:endParaRPr lang="en-US"/>
           </a:p>
@@ -24727,53 +24727,6 @@
               <a:t>(1)</a:t>
             </a:r>
             <a:endParaRPr lang="bg-BG" sz="3200" dirty="0"/>
-          </a:p>
-        </p:txBody>
-      </p:sp>
-      <p:sp>
-        <p:nvSpPr>
-          <p:cNvPr id="9" name="TextBox 8">
-            <a:extLst>
-              <a:ext uri="{FF2B5EF4-FFF2-40B4-BE49-F238E27FC236}">
-                <a16:creationId xmlns:a16="http://schemas.microsoft.com/office/drawing/2014/main" id="{B9A719A5-3E09-4063-AEF5-D2A315964F31}"/>
-              </a:ext>
-            </a:extLst>
-          </p:cNvPr>
-          <p:cNvSpPr txBox="1"/>
-          <p:nvPr/>
-        </p:nvSpPr>
-        <p:spPr>
-          <a:xfrm>
-            <a:off x="801479" y="6381328"/>
-            <a:ext cx="10589042" cy="400006"/>
-          </a:xfrm>
-          <a:prstGeom prst="rect">
-            <a:avLst/>
-          </a:prstGeom>
-          <a:noFill/>
-        </p:spPr>
-        <p:txBody>
-          <a:bodyPr wrap="square" rtlCol="0">
-            <a:spAutoFit/>
-          </a:bodyPr>
-          <a:lstStyle/>
-          <a:p>
-            <a:pPr algn="ctr"/>
-            <a:r>
-              <a:rPr lang="bg-BG" sz="1999" dirty="0"/>
-              <a:t>Проверете решението си тук</a:t>
-            </a:r>
-            <a:r>
-              <a:rPr lang="en-US" sz="1999" dirty="0"/>
-              <a:t>: </a:t>
-            </a:r>
-            <a:r>
-              <a:rPr lang="en-US" sz="1999" dirty="0">
-                <a:hlinkClick r:id="rId2"/>
-              </a:rPr>
-              <a:t>https://judge.softuni.org/Contests/Practice/Index/3902#4</a:t>
-            </a:r>
-            <a:endParaRPr lang="en-US" sz="1999" dirty="0"/>
           </a:p>
         </p:txBody>
       </p:sp>

</xml_diff>